<commit_message>
draft for mobile fading header
</commit_message>
<xml_diff>
--- a/static/img/doc/pics.pptx
+++ b/static/img/doc/pics.pptx
@@ -248,7 +248,7 @@
           <a:p>
             <a:fld id="{AE012AFE-1FD2-420A-8FDC-B1463C197541}" type="datetimeFigureOut">
               <a:rPr lang="de-DE" smtClean="0"/>
-              <a:t>31.07.2018</a:t>
+              <a:t>18.11.2018</a:t>
             </a:fld>
             <a:endParaRPr lang="de-DE"/>
           </a:p>
@@ -418,7 +418,7 @@
           <a:p>
             <a:fld id="{AE012AFE-1FD2-420A-8FDC-B1463C197541}" type="datetimeFigureOut">
               <a:rPr lang="de-DE" smtClean="0"/>
-              <a:t>31.07.2018</a:t>
+              <a:t>18.11.2018</a:t>
             </a:fld>
             <a:endParaRPr lang="de-DE"/>
           </a:p>
@@ -598,7 +598,7 @@
           <a:p>
             <a:fld id="{AE012AFE-1FD2-420A-8FDC-B1463C197541}" type="datetimeFigureOut">
               <a:rPr lang="de-DE" smtClean="0"/>
-              <a:t>31.07.2018</a:t>
+              <a:t>18.11.2018</a:t>
             </a:fld>
             <a:endParaRPr lang="de-DE"/>
           </a:p>
@@ -768,7 +768,7 @@
           <a:p>
             <a:fld id="{AE012AFE-1FD2-420A-8FDC-B1463C197541}" type="datetimeFigureOut">
               <a:rPr lang="de-DE" smtClean="0"/>
-              <a:t>31.07.2018</a:t>
+              <a:t>18.11.2018</a:t>
             </a:fld>
             <a:endParaRPr lang="de-DE"/>
           </a:p>
@@ -1014,7 +1014,7 @@
           <a:p>
             <a:fld id="{AE012AFE-1FD2-420A-8FDC-B1463C197541}" type="datetimeFigureOut">
               <a:rPr lang="de-DE" smtClean="0"/>
-              <a:t>31.07.2018</a:t>
+              <a:t>18.11.2018</a:t>
             </a:fld>
             <a:endParaRPr lang="de-DE"/>
           </a:p>
@@ -1246,7 +1246,7 @@
           <a:p>
             <a:fld id="{AE012AFE-1FD2-420A-8FDC-B1463C197541}" type="datetimeFigureOut">
               <a:rPr lang="de-DE" smtClean="0"/>
-              <a:t>31.07.2018</a:t>
+              <a:t>18.11.2018</a:t>
             </a:fld>
             <a:endParaRPr lang="de-DE"/>
           </a:p>
@@ -1613,7 +1613,7 @@
           <a:p>
             <a:fld id="{AE012AFE-1FD2-420A-8FDC-B1463C197541}" type="datetimeFigureOut">
               <a:rPr lang="de-DE" smtClean="0"/>
-              <a:t>31.07.2018</a:t>
+              <a:t>18.11.2018</a:t>
             </a:fld>
             <a:endParaRPr lang="de-DE"/>
           </a:p>
@@ -1731,7 +1731,7 @@
           <a:p>
             <a:fld id="{AE012AFE-1FD2-420A-8FDC-B1463C197541}" type="datetimeFigureOut">
               <a:rPr lang="de-DE" smtClean="0"/>
-              <a:t>31.07.2018</a:t>
+              <a:t>18.11.2018</a:t>
             </a:fld>
             <a:endParaRPr lang="de-DE"/>
           </a:p>
@@ -1826,7 +1826,7 @@
           <a:p>
             <a:fld id="{AE012AFE-1FD2-420A-8FDC-B1463C197541}" type="datetimeFigureOut">
               <a:rPr lang="de-DE" smtClean="0"/>
-              <a:t>31.07.2018</a:t>
+              <a:t>18.11.2018</a:t>
             </a:fld>
             <a:endParaRPr lang="de-DE"/>
           </a:p>
@@ -2103,7 +2103,7 @@
           <a:p>
             <a:fld id="{AE012AFE-1FD2-420A-8FDC-B1463C197541}" type="datetimeFigureOut">
               <a:rPr lang="de-DE" smtClean="0"/>
-              <a:t>31.07.2018</a:t>
+              <a:t>18.11.2018</a:t>
             </a:fld>
             <a:endParaRPr lang="de-DE"/>
           </a:p>
@@ -2356,7 +2356,7 @@
           <a:p>
             <a:fld id="{AE012AFE-1FD2-420A-8FDC-B1463C197541}" type="datetimeFigureOut">
               <a:rPr lang="de-DE" smtClean="0"/>
-              <a:t>31.07.2018</a:t>
+              <a:t>18.11.2018</a:t>
             </a:fld>
             <a:endParaRPr lang="de-DE"/>
           </a:p>
@@ -2569,7 +2569,7 @@
           <a:p>
             <a:fld id="{AE012AFE-1FD2-420A-8FDC-B1463C197541}" type="datetimeFigureOut">
               <a:rPr lang="de-DE" smtClean="0"/>
-              <a:t>31.07.2018</a:t>
+              <a:t>18.11.2018</a:t>
             </a:fld>
             <a:endParaRPr lang="de-DE"/>
           </a:p>
@@ -3217,6 +3217,13 @@
   <p:clrMapOvr>
     <a:masterClrMapping/>
   </p:clrMapOvr>
+  <p:timing>
+    <p:tnLst>
+      <p:par>
+        <p:cTn id="1" dur="indefinite" restart="never" nodeType="tmRoot"/>
+      </p:par>
+    </p:tnLst>
+  </p:timing>
 </p:sld>
 </file>
 
@@ -3627,6 +3634,13 @@
   <p:clrMapOvr>
     <a:masterClrMapping/>
   </p:clrMapOvr>
+  <p:timing>
+    <p:tnLst>
+      <p:par>
+        <p:cTn id="1" dur="indefinite" restart="never" nodeType="tmRoot"/>
+      </p:par>
+    </p:tnLst>
+  </p:timing>
 </p:sld>
 </file>
 
@@ -4298,6 +4312,13 @@
   <p:clrMapOvr>
     <a:masterClrMapping/>
   </p:clrMapOvr>
+  <p:timing>
+    <p:tnLst>
+      <p:par>
+        <p:cTn id="1" dur="indefinite" restart="never" nodeType="tmRoot"/>
+      </p:par>
+    </p:tnLst>
+  </p:timing>
 </p:sld>
 </file>
 
@@ -5353,6 +5374,13 @@
   <p:clrMapOvr>
     <a:masterClrMapping/>
   </p:clrMapOvr>
+  <p:timing>
+    <p:tnLst>
+      <p:par>
+        <p:cTn id="1" dur="indefinite" restart="never" nodeType="tmRoot"/>
+      </p:par>
+    </p:tnLst>
+  </p:timing>
 </p:sld>
 </file>
 
@@ -5512,9 +5540,12 @@
           <a:p>
             <a:pPr algn="ctr"/>
             <a:r>
-              <a:rPr lang="de-DE" dirty="0" err="1" smtClean="0"/>
+              <a:rPr lang="de-DE" dirty="0" smtClean="0"/>
               <a:t>Q2</a:t>
             </a:r>
+          </a:p>
+          <a:p>
+            <a:pPr algn="ctr"/>
             <a:endParaRPr lang="de-DE" dirty="0"/>
           </a:p>
         </p:txBody>
@@ -5564,9 +5595,12 @@
           <a:p>
             <a:pPr algn="ctr"/>
             <a:r>
-              <a:rPr lang="de-DE" dirty="0" err="1" smtClean="0"/>
+              <a:rPr lang="de-DE" dirty="0" smtClean="0"/>
               <a:t>Q1</a:t>
             </a:r>
+            <a:br>
+              <a:rPr lang="de-DE" dirty="0" smtClean="0"/>
+            </a:br>
             <a:endParaRPr lang="de-DE" dirty="0"/>
           </a:p>
         </p:txBody>
@@ -5606,6 +5640,306 @@
                 <a:schemeClr val="bg1"/>
               </a:solidFill>
             </a:endParaRPr>
+          </a:p>
+        </p:txBody>
+      </p:sp>
+      <p:sp>
+        <p:nvSpPr>
+          <p:cNvPr id="10" name="Rechteck 9"/>
+          <p:cNvSpPr/>
+          <p:nvPr/>
+        </p:nvSpPr>
+        <p:spPr>
+          <a:xfrm>
+            <a:off x="5615996" y="4419600"/>
+            <a:ext cx="891385" cy="259831"/>
+          </a:xfrm>
+          <a:prstGeom prst="rect">
+            <a:avLst/>
+          </a:prstGeom>
+          <a:solidFill>
+            <a:srgbClr val="C5DCF1"/>
+          </a:solidFill>
+          <a:ln>
+            <a:noFill/>
+          </a:ln>
+        </p:spPr>
+        <p:style>
+          <a:lnRef idx="2">
+            <a:schemeClr val="accent1">
+              <a:shade val="50000"/>
+            </a:schemeClr>
+          </a:lnRef>
+          <a:fillRef idx="1">
+            <a:schemeClr val="accent1"/>
+          </a:fillRef>
+          <a:effectRef idx="0">
+            <a:schemeClr val="accent1"/>
+          </a:effectRef>
+          <a:fontRef idx="minor">
+            <a:schemeClr val="lt1"/>
+          </a:fontRef>
+        </p:style>
+        <p:txBody>
+          <a:bodyPr rtlCol="0" anchor="ctr"/>
+          <a:lstStyle/>
+          <a:p>
+            <a:pPr algn="ctr"/>
+            <a:r>
+              <a:rPr lang="de-DE" sz="1400" dirty="0" smtClean="0"/>
+              <a:t>Wave 1</a:t>
+            </a:r>
+            <a:endParaRPr lang="de-DE" sz="1400" dirty="0"/>
+          </a:p>
+        </p:txBody>
+      </p:sp>
+      <p:sp>
+        <p:nvSpPr>
+          <p:cNvPr id="11" name="Rechteck 10"/>
+          <p:cNvSpPr/>
+          <p:nvPr/>
+        </p:nvSpPr>
+        <p:spPr>
+          <a:xfrm>
+            <a:off x="6537710" y="4419600"/>
+            <a:ext cx="891385" cy="259831"/>
+          </a:xfrm>
+          <a:prstGeom prst="rect">
+            <a:avLst/>
+          </a:prstGeom>
+          <a:solidFill>
+            <a:srgbClr val="C5DCF1"/>
+          </a:solidFill>
+          <a:ln>
+            <a:noFill/>
+          </a:ln>
+        </p:spPr>
+        <p:style>
+          <a:lnRef idx="2">
+            <a:schemeClr val="accent1">
+              <a:shade val="50000"/>
+            </a:schemeClr>
+          </a:lnRef>
+          <a:fillRef idx="1">
+            <a:schemeClr val="accent1"/>
+          </a:fillRef>
+          <a:effectRef idx="0">
+            <a:schemeClr val="accent1"/>
+          </a:effectRef>
+          <a:fontRef idx="minor">
+            <a:schemeClr val="lt1"/>
+          </a:fontRef>
+        </p:style>
+        <p:txBody>
+          <a:bodyPr rtlCol="0" anchor="ctr"/>
+          <a:lstStyle/>
+          <a:p>
+            <a:pPr algn="ctr"/>
+            <a:r>
+              <a:rPr lang="de-DE" sz="1400" dirty="0" smtClean="0"/>
+              <a:t>Wave 2</a:t>
+            </a:r>
+            <a:endParaRPr lang="de-DE" sz="1400" dirty="0"/>
+          </a:p>
+        </p:txBody>
+      </p:sp>
+      <p:sp>
+        <p:nvSpPr>
+          <p:cNvPr id="12" name="Rechteck 11"/>
+          <p:cNvSpPr/>
+          <p:nvPr/>
+        </p:nvSpPr>
+        <p:spPr>
+          <a:xfrm>
+            <a:off x="7459426" y="4417840"/>
+            <a:ext cx="221130" cy="259831"/>
+          </a:xfrm>
+          <a:prstGeom prst="rect">
+            <a:avLst/>
+          </a:prstGeom>
+          <a:solidFill>
+            <a:srgbClr val="C5DCF1"/>
+          </a:solidFill>
+          <a:ln>
+            <a:noFill/>
+          </a:ln>
+        </p:spPr>
+        <p:style>
+          <a:lnRef idx="2">
+            <a:schemeClr val="accent1">
+              <a:shade val="50000"/>
+            </a:schemeClr>
+          </a:lnRef>
+          <a:fillRef idx="1">
+            <a:schemeClr val="accent1"/>
+          </a:fillRef>
+          <a:effectRef idx="0">
+            <a:schemeClr val="accent1"/>
+          </a:effectRef>
+          <a:fontRef idx="minor">
+            <a:schemeClr val="lt1"/>
+          </a:fontRef>
+        </p:style>
+        <p:txBody>
+          <a:bodyPr rtlCol="0" anchor="ctr"/>
+          <a:lstStyle/>
+          <a:p>
+            <a:pPr algn="ctr"/>
+            <a:r>
+              <a:rPr lang="de-DE" sz="1400" dirty="0" smtClean="0"/>
+              <a:t>…</a:t>
+            </a:r>
+            <a:endParaRPr lang="de-DE" sz="1400" dirty="0"/>
+          </a:p>
+        </p:txBody>
+      </p:sp>
+      <p:sp>
+        <p:nvSpPr>
+          <p:cNvPr id="13" name="Rechteck 12"/>
+          <p:cNvSpPr/>
+          <p:nvPr/>
+        </p:nvSpPr>
+        <p:spPr>
+          <a:xfrm>
+            <a:off x="5611217" y="3486767"/>
+            <a:ext cx="891385" cy="264116"/>
+          </a:xfrm>
+          <a:prstGeom prst="rect">
+            <a:avLst/>
+          </a:prstGeom>
+          <a:solidFill>
+            <a:srgbClr val="97C0E5"/>
+          </a:solidFill>
+          <a:ln>
+            <a:noFill/>
+          </a:ln>
+        </p:spPr>
+        <p:style>
+          <a:lnRef idx="2">
+            <a:schemeClr val="accent1">
+              <a:shade val="50000"/>
+            </a:schemeClr>
+          </a:lnRef>
+          <a:fillRef idx="1">
+            <a:schemeClr val="accent1"/>
+          </a:fillRef>
+          <a:effectRef idx="0">
+            <a:schemeClr val="accent1"/>
+          </a:effectRef>
+          <a:fontRef idx="minor">
+            <a:schemeClr val="lt1"/>
+          </a:fontRef>
+        </p:style>
+        <p:txBody>
+          <a:bodyPr rtlCol="0" anchor="ctr"/>
+          <a:lstStyle/>
+          <a:p>
+            <a:pPr algn="ctr"/>
+            <a:r>
+              <a:rPr lang="de-DE" sz="1400" dirty="0" smtClean="0"/>
+              <a:t>Wave 1</a:t>
+            </a:r>
+            <a:endParaRPr lang="de-DE" sz="1400" dirty="0"/>
+          </a:p>
+        </p:txBody>
+      </p:sp>
+      <p:sp>
+        <p:nvSpPr>
+          <p:cNvPr id="14" name="Rechteck 13"/>
+          <p:cNvSpPr/>
+          <p:nvPr/>
+        </p:nvSpPr>
+        <p:spPr>
+          <a:xfrm>
+            <a:off x="6532931" y="3486767"/>
+            <a:ext cx="891385" cy="264116"/>
+          </a:xfrm>
+          <a:prstGeom prst="rect">
+            <a:avLst/>
+          </a:prstGeom>
+          <a:solidFill>
+            <a:srgbClr val="97C0E5"/>
+          </a:solidFill>
+          <a:ln>
+            <a:noFill/>
+          </a:ln>
+        </p:spPr>
+        <p:style>
+          <a:lnRef idx="2">
+            <a:schemeClr val="accent1">
+              <a:shade val="50000"/>
+            </a:schemeClr>
+          </a:lnRef>
+          <a:fillRef idx="1">
+            <a:schemeClr val="accent1"/>
+          </a:fillRef>
+          <a:effectRef idx="0">
+            <a:schemeClr val="accent1"/>
+          </a:effectRef>
+          <a:fontRef idx="minor">
+            <a:schemeClr val="lt1"/>
+          </a:fontRef>
+        </p:style>
+        <p:txBody>
+          <a:bodyPr rtlCol="0" anchor="ctr"/>
+          <a:lstStyle/>
+          <a:p>
+            <a:pPr algn="ctr"/>
+            <a:r>
+              <a:rPr lang="de-DE" sz="1400" dirty="0" smtClean="0"/>
+              <a:t>Wave 2</a:t>
+            </a:r>
+            <a:endParaRPr lang="de-DE" sz="1400" dirty="0"/>
+          </a:p>
+        </p:txBody>
+      </p:sp>
+      <p:sp>
+        <p:nvSpPr>
+          <p:cNvPr id="16" name="Rechteck 15"/>
+          <p:cNvSpPr/>
+          <p:nvPr/>
+        </p:nvSpPr>
+        <p:spPr>
+          <a:xfrm>
+            <a:off x="7454647" y="3485007"/>
+            <a:ext cx="221130" cy="264116"/>
+          </a:xfrm>
+          <a:prstGeom prst="rect">
+            <a:avLst/>
+          </a:prstGeom>
+          <a:solidFill>
+            <a:srgbClr val="97C0E5"/>
+          </a:solidFill>
+          <a:ln>
+            <a:noFill/>
+          </a:ln>
+        </p:spPr>
+        <p:style>
+          <a:lnRef idx="2">
+            <a:schemeClr val="accent1">
+              <a:shade val="50000"/>
+            </a:schemeClr>
+          </a:lnRef>
+          <a:fillRef idx="1">
+            <a:schemeClr val="accent1"/>
+          </a:fillRef>
+          <a:effectRef idx="0">
+            <a:schemeClr val="accent1"/>
+          </a:effectRef>
+          <a:fontRef idx="minor">
+            <a:schemeClr val="lt1"/>
+          </a:fontRef>
+        </p:style>
+        <p:txBody>
+          <a:bodyPr rtlCol="0" anchor="ctr"/>
+          <a:lstStyle/>
+          <a:p>
+            <a:pPr algn="ctr"/>
+            <a:r>
+              <a:rPr lang="de-DE" sz="1400" dirty="0" smtClean="0"/>
+              <a:t>…</a:t>
+            </a:r>
+            <a:endParaRPr lang="de-DE" sz="1400" dirty="0"/>
           </a:p>
         </p:txBody>
       </p:sp>

</xml_diff>

<commit_message>
url rewriting for markdown files reworked
</commit_message>
<xml_diff>
--- a/static/img/doc/pics.pptx
+++ b/static/img/doc/pics.pptx
@@ -248,7 +248,7 @@
           <a:p>
             <a:fld id="{AE012AFE-1FD2-420A-8FDC-B1463C197541}" type="datetimeFigureOut">
               <a:rPr lang="de-DE" smtClean="0"/>
-              <a:t>19.11.2018</a:t>
+              <a:t>20.11.2018</a:t>
             </a:fld>
             <a:endParaRPr lang="de-DE"/>
           </a:p>
@@ -418,7 +418,7 @@
           <a:p>
             <a:fld id="{AE012AFE-1FD2-420A-8FDC-B1463C197541}" type="datetimeFigureOut">
               <a:rPr lang="de-DE" smtClean="0"/>
-              <a:t>19.11.2018</a:t>
+              <a:t>20.11.2018</a:t>
             </a:fld>
             <a:endParaRPr lang="de-DE"/>
           </a:p>
@@ -598,7 +598,7 @@
           <a:p>
             <a:fld id="{AE012AFE-1FD2-420A-8FDC-B1463C197541}" type="datetimeFigureOut">
               <a:rPr lang="de-DE" smtClean="0"/>
-              <a:t>19.11.2018</a:t>
+              <a:t>20.11.2018</a:t>
             </a:fld>
             <a:endParaRPr lang="de-DE"/>
           </a:p>
@@ -768,7 +768,7 @@
           <a:p>
             <a:fld id="{AE012AFE-1FD2-420A-8FDC-B1463C197541}" type="datetimeFigureOut">
               <a:rPr lang="de-DE" smtClean="0"/>
-              <a:t>19.11.2018</a:t>
+              <a:t>20.11.2018</a:t>
             </a:fld>
             <a:endParaRPr lang="de-DE"/>
           </a:p>
@@ -1014,7 +1014,7 @@
           <a:p>
             <a:fld id="{AE012AFE-1FD2-420A-8FDC-B1463C197541}" type="datetimeFigureOut">
               <a:rPr lang="de-DE" smtClean="0"/>
-              <a:t>19.11.2018</a:t>
+              <a:t>20.11.2018</a:t>
             </a:fld>
             <a:endParaRPr lang="de-DE"/>
           </a:p>
@@ -1246,7 +1246,7 @@
           <a:p>
             <a:fld id="{AE012AFE-1FD2-420A-8FDC-B1463C197541}" type="datetimeFigureOut">
               <a:rPr lang="de-DE" smtClean="0"/>
-              <a:t>19.11.2018</a:t>
+              <a:t>20.11.2018</a:t>
             </a:fld>
             <a:endParaRPr lang="de-DE"/>
           </a:p>
@@ -1613,7 +1613,7 @@
           <a:p>
             <a:fld id="{AE012AFE-1FD2-420A-8FDC-B1463C197541}" type="datetimeFigureOut">
               <a:rPr lang="de-DE" smtClean="0"/>
-              <a:t>19.11.2018</a:t>
+              <a:t>20.11.2018</a:t>
             </a:fld>
             <a:endParaRPr lang="de-DE"/>
           </a:p>
@@ -1731,7 +1731,7 @@
           <a:p>
             <a:fld id="{AE012AFE-1FD2-420A-8FDC-B1463C197541}" type="datetimeFigureOut">
               <a:rPr lang="de-DE" smtClean="0"/>
-              <a:t>19.11.2018</a:t>
+              <a:t>20.11.2018</a:t>
             </a:fld>
             <a:endParaRPr lang="de-DE"/>
           </a:p>
@@ -1826,7 +1826,7 @@
           <a:p>
             <a:fld id="{AE012AFE-1FD2-420A-8FDC-B1463C197541}" type="datetimeFigureOut">
               <a:rPr lang="de-DE" smtClean="0"/>
-              <a:t>19.11.2018</a:t>
+              <a:t>20.11.2018</a:t>
             </a:fld>
             <a:endParaRPr lang="de-DE"/>
           </a:p>
@@ -2103,7 +2103,7 @@
           <a:p>
             <a:fld id="{AE012AFE-1FD2-420A-8FDC-B1463C197541}" type="datetimeFigureOut">
               <a:rPr lang="de-DE" smtClean="0"/>
-              <a:t>19.11.2018</a:t>
+              <a:t>20.11.2018</a:t>
             </a:fld>
             <a:endParaRPr lang="de-DE"/>
           </a:p>
@@ -2356,7 +2356,7 @@
           <a:p>
             <a:fld id="{AE012AFE-1FD2-420A-8FDC-B1463C197541}" type="datetimeFigureOut">
               <a:rPr lang="de-DE" smtClean="0"/>
-              <a:t>19.11.2018</a:t>
+              <a:t>20.11.2018</a:t>
             </a:fld>
             <a:endParaRPr lang="de-DE"/>
           </a:p>
@@ -2569,7 +2569,7 @@
           <a:p>
             <a:fld id="{AE012AFE-1FD2-420A-8FDC-B1463C197541}" type="datetimeFigureOut">
               <a:rPr lang="de-DE" smtClean="0"/>
-              <a:t>19.11.2018</a:t>
+              <a:t>20.11.2018</a:t>
             </a:fld>
             <a:endParaRPr lang="de-DE"/>
           </a:p>
@@ -5003,8 +5003,8 @@
         </p:nvSpPr>
         <p:spPr>
           <a:xfrm>
-            <a:off x="3730572" y="2860278"/>
-            <a:ext cx="323618" cy="173223"/>
+            <a:off x="3730572" y="2887515"/>
+            <a:ext cx="323618" cy="144000"/>
           </a:xfrm>
           <a:prstGeom prst="rect">
             <a:avLst/>
@@ -5051,8 +5051,8 @@
         </p:nvSpPr>
         <p:spPr>
           <a:xfrm>
-            <a:off x="4524457" y="2857917"/>
-            <a:ext cx="323618" cy="173223"/>
+            <a:off x="4524457" y="2887515"/>
+            <a:ext cx="323618" cy="144000"/>
           </a:xfrm>
           <a:prstGeom prst="rect">
             <a:avLst/>
@@ -5099,8 +5099,8 @@
         </p:nvSpPr>
         <p:spPr>
           <a:xfrm>
-            <a:off x="4140153" y="3100206"/>
-            <a:ext cx="692900" cy="173223"/>
+            <a:off x="4140153" y="3126267"/>
+            <a:ext cx="692900" cy="144000"/>
           </a:xfrm>
           <a:prstGeom prst="rect">
             <a:avLst/>
@@ -5147,8 +5147,8 @@
         </p:nvSpPr>
         <p:spPr>
           <a:xfrm>
-            <a:off x="3323701" y="2914302"/>
-            <a:ext cx="323618" cy="67605"/>
+            <a:off x="3323701" y="2905515"/>
+            <a:ext cx="323618" cy="108000"/>
           </a:xfrm>
           <a:prstGeom prst="rect">
             <a:avLst/>
@@ -5195,8 +5195,8 @@
         </p:nvSpPr>
         <p:spPr>
           <a:xfrm>
-            <a:off x="4124020" y="2917113"/>
-            <a:ext cx="323618" cy="67605"/>
+            <a:off x="4124020" y="2905515"/>
+            <a:ext cx="323618" cy="108000"/>
           </a:xfrm>
           <a:prstGeom prst="rect">
             <a:avLst/>
@@ -5243,8 +5243,8 @@
         </p:nvSpPr>
         <p:spPr>
           <a:xfrm>
-            <a:off x="3339279" y="3152329"/>
-            <a:ext cx="692900" cy="71116"/>
+            <a:off x="3339279" y="3144267"/>
+            <a:ext cx="692900" cy="108000"/>
           </a:xfrm>
           <a:prstGeom prst="rect">
             <a:avLst/>

</xml_diff>

<commit_message>
Dockerfile with external log and config directory
</commit_message>
<xml_diff>
--- a/static/img/doc/pics.pptx
+++ b/static/img/doc/pics.pptx
@@ -248,7 +248,7 @@
           <a:p>
             <a:fld id="{AE012AFE-1FD2-420A-8FDC-B1463C197541}" type="datetimeFigureOut">
               <a:rPr lang="de-DE" smtClean="0"/>
-              <a:t>20.11.2018</a:t>
+              <a:t>31.05.2019</a:t>
             </a:fld>
             <a:endParaRPr lang="de-DE"/>
           </a:p>
@@ -418,7 +418,7 @@
           <a:p>
             <a:fld id="{AE012AFE-1FD2-420A-8FDC-B1463C197541}" type="datetimeFigureOut">
               <a:rPr lang="de-DE" smtClean="0"/>
-              <a:t>20.11.2018</a:t>
+              <a:t>31.05.2019</a:t>
             </a:fld>
             <a:endParaRPr lang="de-DE"/>
           </a:p>
@@ -598,7 +598,7 @@
           <a:p>
             <a:fld id="{AE012AFE-1FD2-420A-8FDC-B1463C197541}" type="datetimeFigureOut">
               <a:rPr lang="de-DE" smtClean="0"/>
-              <a:t>20.11.2018</a:t>
+              <a:t>31.05.2019</a:t>
             </a:fld>
             <a:endParaRPr lang="de-DE"/>
           </a:p>
@@ -768,7 +768,7 @@
           <a:p>
             <a:fld id="{AE012AFE-1FD2-420A-8FDC-B1463C197541}" type="datetimeFigureOut">
               <a:rPr lang="de-DE" smtClean="0"/>
-              <a:t>20.11.2018</a:t>
+              <a:t>31.05.2019</a:t>
             </a:fld>
             <a:endParaRPr lang="de-DE"/>
           </a:p>
@@ -1014,7 +1014,7 @@
           <a:p>
             <a:fld id="{AE012AFE-1FD2-420A-8FDC-B1463C197541}" type="datetimeFigureOut">
               <a:rPr lang="de-DE" smtClean="0"/>
-              <a:t>20.11.2018</a:t>
+              <a:t>31.05.2019</a:t>
             </a:fld>
             <a:endParaRPr lang="de-DE"/>
           </a:p>
@@ -1246,7 +1246,7 @@
           <a:p>
             <a:fld id="{AE012AFE-1FD2-420A-8FDC-B1463C197541}" type="datetimeFigureOut">
               <a:rPr lang="de-DE" smtClean="0"/>
-              <a:t>20.11.2018</a:t>
+              <a:t>31.05.2019</a:t>
             </a:fld>
             <a:endParaRPr lang="de-DE"/>
           </a:p>
@@ -1613,7 +1613,7 @@
           <a:p>
             <a:fld id="{AE012AFE-1FD2-420A-8FDC-B1463C197541}" type="datetimeFigureOut">
               <a:rPr lang="de-DE" smtClean="0"/>
-              <a:t>20.11.2018</a:t>
+              <a:t>31.05.2019</a:t>
             </a:fld>
             <a:endParaRPr lang="de-DE"/>
           </a:p>
@@ -1731,7 +1731,7 @@
           <a:p>
             <a:fld id="{AE012AFE-1FD2-420A-8FDC-B1463C197541}" type="datetimeFigureOut">
               <a:rPr lang="de-DE" smtClean="0"/>
-              <a:t>20.11.2018</a:t>
+              <a:t>31.05.2019</a:t>
             </a:fld>
             <a:endParaRPr lang="de-DE"/>
           </a:p>
@@ -1826,7 +1826,7 @@
           <a:p>
             <a:fld id="{AE012AFE-1FD2-420A-8FDC-B1463C197541}" type="datetimeFigureOut">
               <a:rPr lang="de-DE" smtClean="0"/>
-              <a:t>20.11.2018</a:t>
+              <a:t>31.05.2019</a:t>
             </a:fld>
             <a:endParaRPr lang="de-DE"/>
           </a:p>
@@ -2103,7 +2103,7 @@
           <a:p>
             <a:fld id="{AE012AFE-1FD2-420A-8FDC-B1463C197541}" type="datetimeFigureOut">
               <a:rPr lang="de-DE" smtClean="0"/>
-              <a:t>20.11.2018</a:t>
+              <a:t>31.05.2019</a:t>
             </a:fld>
             <a:endParaRPr lang="de-DE"/>
           </a:p>
@@ -2356,7 +2356,7 @@
           <a:p>
             <a:fld id="{AE012AFE-1FD2-420A-8FDC-B1463C197541}" type="datetimeFigureOut">
               <a:rPr lang="de-DE" smtClean="0"/>
-              <a:t>20.11.2018</a:t>
+              <a:t>31.05.2019</a:t>
             </a:fld>
             <a:endParaRPr lang="de-DE"/>
           </a:p>
@@ -2569,7 +2569,7 @@
           <a:p>
             <a:fld id="{AE012AFE-1FD2-420A-8FDC-B1463C197541}" type="datetimeFigureOut">
               <a:rPr lang="de-DE" smtClean="0"/>
-              <a:t>20.11.2018</a:t>
+              <a:t>31.05.2019</a:t>
             </a:fld>
             <a:endParaRPr lang="de-DE"/>
           </a:p>
@@ -5381,7 +5381,7 @@
           <a:prstGeom prst="corner">
             <a:avLst>
               <a:gd name="adj1" fmla="val 31498"/>
-              <a:gd name="adj2" fmla="val 30176"/>
+              <a:gd name="adj2" fmla="val 22620"/>
             </a:avLst>
           </a:prstGeom>
           <a:solidFill>
@@ -5427,8 +5427,8 @@
         </p:nvSpPr>
         <p:spPr>
           <a:xfrm>
-            <a:off x="5261811" y="3971658"/>
-            <a:ext cx="2502566" cy="784824"/>
+            <a:off x="5261811" y="3811163"/>
+            <a:ext cx="2502566" cy="945319"/>
           </a:xfrm>
           <a:prstGeom prst="rect">
             <a:avLst/>
@@ -5459,9 +5459,17 @@
           <a:p>
             <a:pPr algn="ctr"/>
             <a:r>
-              <a:rPr lang="de-DE" dirty="0" smtClean="0"/>
-              <a:t>Q2</a:t>
-            </a:r>
+              <a:rPr lang="de-DE" sz="2000" dirty="0" smtClean="0"/>
+              <a:t>Survey</a:t>
+            </a:r>
+          </a:p>
+          <a:p>
+            <a:pPr algn="ctr"/>
+            <a:r>
+              <a:rPr lang="de-DE" sz="1600" dirty="0" smtClean="0"/>
+              <a:t>Quest 2</a:t>
+            </a:r>
+            <a:endParaRPr lang="de-DE" sz="1600" dirty="0" smtClean="0"/>
           </a:p>
           <a:p>
             <a:pPr algn="ctr"/>
@@ -5477,8 +5485,8 @@
         </p:nvSpPr>
         <p:spPr>
           <a:xfrm>
-            <a:off x="5261811" y="3042259"/>
-            <a:ext cx="2502564" cy="784824"/>
+            <a:off x="5261811" y="2832854"/>
+            <a:ext cx="2502564" cy="901528"/>
           </a:xfrm>
           <a:prstGeom prst="rect">
             <a:avLst/>
@@ -5514,13 +5522,24 @@
           <a:p>
             <a:pPr algn="ctr"/>
             <a:r>
-              <a:rPr lang="de-DE" dirty="0" smtClean="0"/>
-              <a:t>Q1</a:t>
+              <a:rPr lang="de-DE" sz="2000" dirty="0" smtClean="0"/>
+              <a:t>Survey</a:t>
+            </a:r>
+          </a:p>
+          <a:p>
+            <a:pPr algn="ctr"/>
+            <a:r>
+              <a:rPr lang="de-DE" sz="1600" dirty="0" smtClean="0"/>
+              <a:t>Quest 1</a:t>
+            </a:r>
+            <a:r>
+              <a:rPr lang="de-DE" sz="1600" dirty="0" smtClean="0"/>
+              <a:t/>
             </a:r>
             <a:br>
-              <a:rPr lang="de-DE" dirty="0" smtClean="0"/>
+              <a:rPr lang="de-DE" sz="1600" dirty="0" smtClean="0"/>
             </a:br>
-            <a:endParaRPr lang="de-DE" dirty="0"/>
+            <a:endParaRPr lang="de-DE" sz="1600" dirty="0"/>
           </a:p>
         </p:txBody>
       </p:sp>
@@ -5564,163 +5583,13 @@
       </p:sp>
       <p:sp>
         <p:nvSpPr>
-          <p:cNvPr id="10" name="Rechteck 9"/>
-          <p:cNvSpPr/>
-          <p:nvPr/>
-        </p:nvSpPr>
-        <p:spPr>
-          <a:xfrm>
-            <a:off x="5615996" y="4419600"/>
-            <a:ext cx="891385" cy="259831"/>
-          </a:xfrm>
-          <a:prstGeom prst="rect">
-            <a:avLst/>
-          </a:prstGeom>
-          <a:solidFill>
-            <a:srgbClr val="C5DCF1"/>
-          </a:solidFill>
-          <a:ln>
-            <a:noFill/>
-          </a:ln>
-        </p:spPr>
-        <p:style>
-          <a:lnRef idx="2">
-            <a:schemeClr val="accent1">
-              <a:shade val="50000"/>
-            </a:schemeClr>
-          </a:lnRef>
-          <a:fillRef idx="1">
-            <a:schemeClr val="accent1"/>
-          </a:fillRef>
-          <a:effectRef idx="0">
-            <a:schemeClr val="accent1"/>
-          </a:effectRef>
-          <a:fontRef idx="minor">
-            <a:schemeClr val="lt1"/>
-          </a:fontRef>
-        </p:style>
-        <p:txBody>
-          <a:bodyPr rtlCol="0" anchor="ctr"/>
-          <a:lstStyle/>
-          <a:p>
-            <a:pPr algn="ctr"/>
-            <a:r>
-              <a:rPr lang="de-DE" sz="1400" dirty="0" smtClean="0"/>
-              <a:t>Wave 1</a:t>
-            </a:r>
-            <a:endParaRPr lang="de-DE" sz="1400" dirty="0"/>
-          </a:p>
-        </p:txBody>
-      </p:sp>
-      <p:sp>
-        <p:nvSpPr>
-          <p:cNvPr id="11" name="Rechteck 10"/>
-          <p:cNvSpPr/>
-          <p:nvPr/>
-        </p:nvSpPr>
-        <p:spPr>
-          <a:xfrm>
-            <a:off x="6537710" y="4419600"/>
-            <a:ext cx="891385" cy="259831"/>
-          </a:xfrm>
-          <a:prstGeom prst="rect">
-            <a:avLst/>
-          </a:prstGeom>
-          <a:solidFill>
-            <a:srgbClr val="C5DCF1"/>
-          </a:solidFill>
-          <a:ln>
-            <a:noFill/>
-          </a:ln>
-        </p:spPr>
-        <p:style>
-          <a:lnRef idx="2">
-            <a:schemeClr val="accent1">
-              <a:shade val="50000"/>
-            </a:schemeClr>
-          </a:lnRef>
-          <a:fillRef idx="1">
-            <a:schemeClr val="accent1"/>
-          </a:fillRef>
-          <a:effectRef idx="0">
-            <a:schemeClr val="accent1"/>
-          </a:effectRef>
-          <a:fontRef idx="minor">
-            <a:schemeClr val="lt1"/>
-          </a:fontRef>
-        </p:style>
-        <p:txBody>
-          <a:bodyPr rtlCol="0" anchor="ctr"/>
-          <a:lstStyle/>
-          <a:p>
-            <a:pPr algn="ctr"/>
-            <a:r>
-              <a:rPr lang="de-DE" sz="1400" dirty="0" smtClean="0"/>
-              <a:t>Wave 2</a:t>
-            </a:r>
-            <a:endParaRPr lang="de-DE" sz="1400" dirty="0"/>
-          </a:p>
-        </p:txBody>
-      </p:sp>
-      <p:sp>
-        <p:nvSpPr>
-          <p:cNvPr id="12" name="Rechteck 11"/>
-          <p:cNvSpPr/>
-          <p:nvPr/>
-        </p:nvSpPr>
-        <p:spPr>
-          <a:xfrm>
-            <a:off x="7459426" y="4417840"/>
-            <a:ext cx="221130" cy="259831"/>
-          </a:xfrm>
-          <a:prstGeom prst="rect">
-            <a:avLst/>
-          </a:prstGeom>
-          <a:solidFill>
-            <a:srgbClr val="C5DCF1"/>
-          </a:solidFill>
-          <a:ln>
-            <a:noFill/>
-          </a:ln>
-        </p:spPr>
-        <p:style>
-          <a:lnRef idx="2">
-            <a:schemeClr val="accent1">
-              <a:shade val="50000"/>
-            </a:schemeClr>
-          </a:lnRef>
-          <a:fillRef idx="1">
-            <a:schemeClr val="accent1"/>
-          </a:fillRef>
-          <a:effectRef idx="0">
-            <a:schemeClr val="accent1"/>
-          </a:effectRef>
-          <a:fontRef idx="minor">
-            <a:schemeClr val="lt1"/>
-          </a:fontRef>
-        </p:style>
-        <p:txBody>
-          <a:bodyPr rtlCol="0" anchor="ctr"/>
-          <a:lstStyle/>
-          <a:p>
-            <a:pPr algn="ctr"/>
-            <a:r>
-              <a:rPr lang="de-DE" sz="1400" dirty="0" smtClean="0"/>
-              <a:t>…</a:t>
-            </a:r>
-            <a:endParaRPr lang="de-DE" sz="1400" dirty="0"/>
-          </a:p>
-        </p:txBody>
-      </p:sp>
-      <p:sp>
-        <p:nvSpPr>
           <p:cNvPr id="13" name="Rechteck 12"/>
           <p:cNvSpPr/>
           <p:nvPr/>
         </p:nvSpPr>
         <p:spPr>
           <a:xfrm>
-            <a:off x="5611217" y="3486767"/>
+            <a:off x="5611217" y="3430922"/>
             <a:ext cx="891385" cy="264116"/>
           </a:xfrm>
           <a:prstGeom prst="rect">
@@ -5770,7 +5639,7 @@
         </p:nvSpPr>
         <p:spPr>
           <a:xfrm>
-            <a:off x="6532931" y="3486767"/>
+            <a:off x="6532931" y="3430922"/>
             <a:ext cx="891385" cy="264116"/>
           </a:xfrm>
           <a:prstGeom prst="rect">
@@ -5820,7 +5689,157 @@
         </p:nvSpPr>
         <p:spPr>
           <a:xfrm>
-            <a:off x="7454647" y="3485007"/>
+            <a:off x="7454647" y="3429162"/>
+            <a:ext cx="221130" cy="264116"/>
+          </a:xfrm>
+          <a:prstGeom prst="rect">
+            <a:avLst/>
+          </a:prstGeom>
+          <a:solidFill>
+            <a:srgbClr val="97C0E5"/>
+          </a:solidFill>
+          <a:ln>
+            <a:noFill/>
+          </a:ln>
+        </p:spPr>
+        <p:style>
+          <a:lnRef idx="2">
+            <a:schemeClr val="accent1">
+              <a:shade val="50000"/>
+            </a:schemeClr>
+          </a:lnRef>
+          <a:fillRef idx="1">
+            <a:schemeClr val="accent1"/>
+          </a:fillRef>
+          <a:effectRef idx="0">
+            <a:schemeClr val="accent1"/>
+          </a:effectRef>
+          <a:fontRef idx="minor">
+            <a:schemeClr val="lt1"/>
+          </a:fontRef>
+        </p:style>
+        <p:txBody>
+          <a:bodyPr rtlCol="0" anchor="ctr"/>
+          <a:lstStyle/>
+          <a:p>
+            <a:pPr algn="ctr"/>
+            <a:r>
+              <a:rPr lang="de-DE" sz="1400" dirty="0" smtClean="0"/>
+              <a:t>…</a:t>
+            </a:r>
+            <a:endParaRPr lang="de-DE" sz="1400" dirty="0"/>
+          </a:p>
+        </p:txBody>
+      </p:sp>
+      <p:sp>
+        <p:nvSpPr>
+          <p:cNvPr id="17" name="Rechteck 16"/>
+          <p:cNvSpPr/>
+          <p:nvPr/>
+        </p:nvSpPr>
+        <p:spPr>
+          <a:xfrm>
+            <a:off x="5603075" y="4434895"/>
+            <a:ext cx="891385" cy="264116"/>
+          </a:xfrm>
+          <a:prstGeom prst="rect">
+            <a:avLst/>
+          </a:prstGeom>
+          <a:solidFill>
+            <a:srgbClr val="97C0E5"/>
+          </a:solidFill>
+          <a:ln>
+            <a:noFill/>
+          </a:ln>
+        </p:spPr>
+        <p:style>
+          <a:lnRef idx="2">
+            <a:schemeClr val="accent1">
+              <a:shade val="50000"/>
+            </a:schemeClr>
+          </a:lnRef>
+          <a:fillRef idx="1">
+            <a:schemeClr val="accent1"/>
+          </a:fillRef>
+          <a:effectRef idx="0">
+            <a:schemeClr val="accent1"/>
+          </a:effectRef>
+          <a:fontRef idx="minor">
+            <a:schemeClr val="lt1"/>
+          </a:fontRef>
+        </p:style>
+        <p:txBody>
+          <a:bodyPr rtlCol="0" anchor="ctr"/>
+          <a:lstStyle/>
+          <a:p>
+            <a:pPr algn="ctr"/>
+            <a:r>
+              <a:rPr lang="de-DE" sz="1400" dirty="0" smtClean="0"/>
+              <a:t>Wave 1</a:t>
+            </a:r>
+            <a:endParaRPr lang="de-DE" sz="1400" dirty="0"/>
+          </a:p>
+        </p:txBody>
+      </p:sp>
+      <p:sp>
+        <p:nvSpPr>
+          <p:cNvPr id="18" name="Rechteck 17"/>
+          <p:cNvSpPr/>
+          <p:nvPr/>
+        </p:nvSpPr>
+        <p:spPr>
+          <a:xfrm>
+            <a:off x="6524789" y="4434895"/>
+            <a:ext cx="891385" cy="264116"/>
+          </a:xfrm>
+          <a:prstGeom prst="rect">
+            <a:avLst/>
+          </a:prstGeom>
+          <a:solidFill>
+            <a:srgbClr val="97C0E5"/>
+          </a:solidFill>
+          <a:ln>
+            <a:noFill/>
+          </a:ln>
+        </p:spPr>
+        <p:style>
+          <a:lnRef idx="2">
+            <a:schemeClr val="accent1">
+              <a:shade val="50000"/>
+            </a:schemeClr>
+          </a:lnRef>
+          <a:fillRef idx="1">
+            <a:schemeClr val="accent1"/>
+          </a:fillRef>
+          <a:effectRef idx="0">
+            <a:schemeClr val="accent1"/>
+          </a:effectRef>
+          <a:fontRef idx="minor">
+            <a:schemeClr val="lt1"/>
+          </a:fontRef>
+        </p:style>
+        <p:txBody>
+          <a:bodyPr rtlCol="0" anchor="ctr"/>
+          <a:lstStyle/>
+          <a:p>
+            <a:pPr algn="ctr"/>
+            <a:r>
+              <a:rPr lang="de-DE" sz="1400" dirty="0" smtClean="0"/>
+              <a:t>Wave 2</a:t>
+            </a:r>
+            <a:endParaRPr lang="de-DE" sz="1400" dirty="0"/>
+          </a:p>
+        </p:txBody>
+      </p:sp>
+      <p:sp>
+        <p:nvSpPr>
+          <p:cNvPr id="19" name="Rechteck 18"/>
+          <p:cNvSpPr/>
+          <p:nvPr/>
+        </p:nvSpPr>
+        <p:spPr>
+          <a:xfrm>
+            <a:off x="7446505" y="4433135"/>
             <a:ext cx="221130" cy="264116"/>
           </a:xfrm>
           <a:prstGeom prst="rect">

</xml_diff>